<commit_message>
re -edit national flags lesson
</commit_message>
<xml_diff>
--- a/課程資料/海龜畫國旗/摘要.pptx
+++ b/課程資料/海龜畫國旗/摘要.pptx
@@ -259,7 +259,7 @@
           <a:p>
             <a:fld id="{FA16A518-A0C3-4B00-9084-763C6916F68A}" type="datetimeFigureOut">
               <a:rPr lang="zh-TW" altLang="en-US" smtClean="0"/>
-              <a:t>2022/1/26</a:t>
+              <a:t>2022/2/2</a:t>
             </a:fld>
             <a:endParaRPr lang="zh-TW" altLang="en-US"/>
           </a:p>
@@ -457,7 +457,7 @@
           <a:p>
             <a:fld id="{FA16A518-A0C3-4B00-9084-763C6916F68A}" type="datetimeFigureOut">
               <a:rPr lang="zh-TW" altLang="en-US" smtClean="0"/>
-              <a:t>2022/1/26</a:t>
+              <a:t>2022/2/2</a:t>
             </a:fld>
             <a:endParaRPr lang="zh-TW" altLang="en-US"/>
           </a:p>
@@ -665,7 +665,7 @@
           <a:p>
             <a:fld id="{FA16A518-A0C3-4B00-9084-763C6916F68A}" type="datetimeFigureOut">
               <a:rPr lang="zh-TW" altLang="en-US" smtClean="0"/>
-              <a:t>2022/1/26</a:t>
+              <a:t>2022/2/2</a:t>
             </a:fld>
             <a:endParaRPr lang="zh-TW" altLang="en-US"/>
           </a:p>
@@ -863,7 +863,7 @@
           <a:p>
             <a:fld id="{FA16A518-A0C3-4B00-9084-763C6916F68A}" type="datetimeFigureOut">
               <a:rPr lang="zh-TW" altLang="en-US" smtClean="0"/>
-              <a:t>2022/1/26</a:t>
+              <a:t>2022/2/2</a:t>
             </a:fld>
             <a:endParaRPr lang="zh-TW" altLang="en-US"/>
           </a:p>
@@ -1138,7 +1138,7 @@
           <a:p>
             <a:fld id="{FA16A518-A0C3-4B00-9084-763C6916F68A}" type="datetimeFigureOut">
               <a:rPr lang="zh-TW" altLang="en-US" smtClean="0"/>
-              <a:t>2022/1/26</a:t>
+              <a:t>2022/2/2</a:t>
             </a:fld>
             <a:endParaRPr lang="zh-TW" altLang="en-US"/>
           </a:p>
@@ -1403,7 +1403,7 @@
           <a:p>
             <a:fld id="{FA16A518-A0C3-4B00-9084-763C6916F68A}" type="datetimeFigureOut">
               <a:rPr lang="zh-TW" altLang="en-US" smtClean="0"/>
-              <a:t>2022/1/26</a:t>
+              <a:t>2022/2/2</a:t>
             </a:fld>
             <a:endParaRPr lang="zh-TW" altLang="en-US"/>
           </a:p>
@@ -1815,7 +1815,7 @@
           <a:p>
             <a:fld id="{FA16A518-A0C3-4B00-9084-763C6916F68A}" type="datetimeFigureOut">
               <a:rPr lang="zh-TW" altLang="en-US" smtClean="0"/>
-              <a:t>2022/1/26</a:t>
+              <a:t>2022/2/2</a:t>
             </a:fld>
             <a:endParaRPr lang="zh-TW" altLang="en-US"/>
           </a:p>
@@ -1956,7 +1956,7 @@
           <a:p>
             <a:fld id="{FA16A518-A0C3-4B00-9084-763C6916F68A}" type="datetimeFigureOut">
               <a:rPr lang="zh-TW" altLang="en-US" smtClean="0"/>
-              <a:t>2022/1/26</a:t>
+              <a:t>2022/2/2</a:t>
             </a:fld>
             <a:endParaRPr lang="zh-TW" altLang="en-US"/>
           </a:p>
@@ -2069,7 +2069,7 @@
           <a:p>
             <a:fld id="{FA16A518-A0C3-4B00-9084-763C6916F68A}" type="datetimeFigureOut">
               <a:rPr lang="zh-TW" altLang="en-US" smtClean="0"/>
-              <a:t>2022/1/26</a:t>
+              <a:t>2022/2/2</a:t>
             </a:fld>
             <a:endParaRPr lang="zh-TW" altLang="en-US"/>
           </a:p>
@@ -2380,7 +2380,7 @@
           <a:p>
             <a:fld id="{FA16A518-A0C3-4B00-9084-763C6916F68A}" type="datetimeFigureOut">
               <a:rPr lang="zh-TW" altLang="en-US" smtClean="0"/>
-              <a:t>2022/1/26</a:t>
+              <a:t>2022/2/2</a:t>
             </a:fld>
             <a:endParaRPr lang="zh-TW" altLang="en-US"/>
           </a:p>
@@ -2668,7 +2668,7 @@
           <a:p>
             <a:fld id="{FA16A518-A0C3-4B00-9084-763C6916F68A}" type="datetimeFigureOut">
               <a:rPr lang="zh-TW" altLang="en-US" smtClean="0"/>
-              <a:t>2022/1/26</a:t>
+              <a:t>2022/2/2</a:t>
             </a:fld>
             <a:endParaRPr lang="zh-TW" altLang="en-US"/>
           </a:p>
@@ -2909,7 +2909,7 @@
           <a:p>
             <a:fld id="{FA16A518-A0C3-4B00-9084-763C6916F68A}" type="datetimeFigureOut">
               <a:rPr lang="zh-TW" altLang="en-US" smtClean="0"/>
-              <a:t>2022/1/26</a:t>
+              <a:t>2022/2/2</a:t>
             </a:fld>
             <a:endParaRPr lang="zh-TW" altLang="en-US"/>
           </a:p>
@@ -3347,7 +3347,7 @@
         </p:blipFill>
         <p:spPr>
           <a:xfrm>
-            <a:off x="2027853" y="2774400"/>
+            <a:off x="1850572" y="721665"/>
             <a:ext cx="2233568" cy="1517682"/>
           </a:xfrm>
           <a:prstGeom prst="rect">
@@ -3376,7 +3376,7 @@
         </p:blipFill>
         <p:spPr>
           <a:xfrm>
-            <a:off x="4211216" y="2817844"/>
+            <a:off x="4033935" y="765109"/>
             <a:ext cx="2183363" cy="1452368"/>
           </a:xfrm>
           <a:prstGeom prst="rect">
@@ -3405,8 +3405,37 @@
         </p:blipFill>
         <p:spPr>
           <a:xfrm>
-            <a:off x="6419461" y="2850235"/>
+            <a:off x="2027853" y="3540701"/>
             <a:ext cx="2006082" cy="1344143"/>
+          </a:xfrm>
+          <a:prstGeom prst="rect">
+            <a:avLst/>
+          </a:prstGeom>
+        </p:spPr>
+      </p:pic>
+      <p:pic>
+        <p:nvPicPr>
+          <p:cNvPr id="2" name="圖片 1">
+            <a:extLst>
+              <a:ext uri="{FF2B5EF4-FFF2-40B4-BE49-F238E27FC236}">
+                <a16:creationId xmlns:a16="http://schemas.microsoft.com/office/drawing/2014/main" id="{09956724-01D5-4527-9982-81C1A15C1FC5}"/>
+              </a:ext>
+            </a:extLst>
+          </p:cNvPr>
+          <p:cNvPicPr>
+            <a:picLocks noChangeAspect="1"/>
+          </p:cNvPicPr>
+          <p:nvPr/>
+        </p:nvPicPr>
+        <p:blipFill rotWithShape="1">
+          <a:blip r:embed="rId5"/>
+          <a:srcRect l="20893" t="21225" r="63418" b="59863"/>
+          <a:stretch/>
+        </p:blipFill>
+        <p:spPr>
+          <a:xfrm>
+            <a:off x="6267503" y="832029"/>
+            <a:ext cx="1937935" cy="1314012"/>
           </a:xfrm>
           <a:prstGeom prst="rect">
             <a:avLst/>

</xml_diff>

<commit_message>
work on shoot lab lesson
</commit_message>
<xml_diff>
--- a/課程資料/海龜畫國旗/摘要.pptx
+++ b/課程資料/海龜畫國旗/摘要.pptx
@@ -259,7 +259,7 @@
           <a:p>
             <a:fld id="{FA16A518-A0C3-4B00-9084-763C6916F68A}" type="datetimeFigureOut">
               <a:rPr lang="zh-TW" altLang="en-US" smtClean="0"/>
-              <a:t>2022/2/2</a:t>
+              <a:t>2022/3/4</a:t>
             </a:fld>
             <a:endParaRPr lang="zh-TW" altLang="en-US"/>
           </a:p>
@@ -457,7 +457,7 @@
           <a:p>
             <a:fld id="{FA16A518-A0C3-4B00-9084-763C6916F68A}" type="datetimeFigureOut">
               <a:rPr lang="zh-TW" altLang="en-US" smtClean="0"/>
-              <a:t>2022/2/2</a:t>
+              <a:t>2022/3/4</a:t>
             </a:fld>
             <a:endParaRPr lang="zh-TW" altLang="en-US"/>
           </a:p>
@@ -665,7 +665,7 @@
           <a:p>
             <a:fld id="{FA16A518-A0C3-4B00-9084-763C6916F68A}" type="datetimeFigureOut">
               <a:rPr lang="zh-TW" altLang="en-US" smtClean="0"/>
-              <a:t>2022/2/2</a:t>
+              <a:t>2022/3/4</a:t>
             </a:fld>
             <a:endParaRPr lang="zh-TW" altLang="en-US"/>
           </a:p>
@@ -863,7 +863,7 @@
           <a:p>
             <a:fld id="{FA16A518-A0C3-4B00-9084-763C6916F68A}" type="datetimeFigureOut">
               <a:rPr lang="zh-TW" altLang="en-US" smtClean="0"/>
-              <a:t>2022/2/2</a:t>
+              <a:t>2022/3/4</a:t>
             </a:fld>
             <a:endParaRPr lang="zh-TW" altLang="en-US"/>
           </a:p>
@@ -1138,7 +1138,7 @@
           <a:p>
             <a:fld id="{FA16A518-A0C3-4B00-9084-763C6916F68A}" type="datetimeFigureOut">
               <a:rPr lang="zh-TW" altLang="en-US" smtClean="0"/>
-              <a:t>2022/2/2</a:t>
+              <a:t>2022/3/4</a:t>
             </a:fld>
             <a:endParaRPr lang="zh-TW" altLang="en-US"/>
           </a:p>
@@ -1403,7 +1403,7 @@
           <a:p>
             <a:fld id="{FA16A518-A0C3-4B00-9084-763C6916F68A}" type="datetimeFigureOut">
               <a:rPr lang="zh-TW" altLang="en-US" smtClean="0"/>
-              <a:t>2022/2/2</a:t>
+              <a:t>2022/3/4</a:t>
             </a:fld>
             <a:endParaRPr lang="zh-TW" altLang="en-US"/>
           </a:p>
@@ -1815,7 +1815,7 @@
           <a:p>
             <a:fld id="{FA16A518-A0C3-4B00-9084-763C6916F68A}" type="datetimeFigureOut">
               <a:rPr lang="zh-TW" altLang="en-US" smtClean="0"/>
-              <a:t>2022/2/2</a:t>
+              <a:t>2022/3/4</a:t>
             </a:fld>
             <a:endParaRPr lang="zh-TW" altLang="en-US"/>
           </a:p>
@@ -1956,7 +1956,7 @@
           <a:p>
             <a:fld id="{FA16A518-A0C3-4B00-9084-763C6916F68A}" type="datetimeFigureOut">
               <a:rPr lang="zh-TW" altLang="en-US" smtClean="0"/>
-              <a:t>2022/2/2</a:t>
+              <a:t>2022/3/4</a:t>
             </a:fld>
             <a:endParaRPr lang="zh-TW" altLang="en-US"/>
           </a:p>
@@ -2069,7 +2069,7 @@
           <a:p>
             <a:fld id="{FA16A518-A0C3-4B00-9084-763C6916F68A}" type="datetimeFigureOut">
               <a:rPr lang="zh-TW" altLang="en-US" smtClean="0"/>
-              <a:t>2022/2/2</a:t>
+              <a:t>2022/3/4</a:t>
             </a:fld>
             <a:endParaRPr lang="zh-TW" altLang="en-US"/>
           </a:p>
@@ -2380,7 +2380,7 @@
           <a:p>
             <a:fld id="{FA16A518-A0C3-4B00-9084-763C6916F68A}" type="datetimeFigureOut">
               <a:rPr lang="zh-TW" altLang="en-US" smtClean="0"/>
-              <a:t>2022/2/2</a:t>
+              <a:t>2022/3/4</a:t>
             </a:fld>
             <a:endParaRPr lang="zh-TW" altLang="en-US"/>
           </a:p>
@@ -2668,7 +2668,7 @@
           <a:p>
             <a:fld id="{FA16A518-A0C3-4B00-9084-763C6916F68A}" type="datetimeFigureOut">
               <a:rPr lang="zh-TW" altLang="en-US" smtClean="0"/>
-              <a:t>2022/2/2</a:t>
+              <a:t>2022/3/4</a:t>
             </a:fld>
             <a:endParaRPr lang="zh-TW" altLang="en-US"/>
           </a:p>
@@ -2909,7 +2909,7 @@
           <a:p>
             <a:fld id="{FA16A518-A0C3-4B00-9084-763C6916F68A}" type="datetimeFigureOut">
               <a:rPr lang="zh-TW" altLang="en-US" smtClean="0"/>
-              <a:t>2022/2/2</a:t>
+              <a:t>2022/3/4</a:t>
             </a:fld>
             <a:endParaRPr lang="zh-TW" altLang="en-US"/>
           </a:p>
@@ -3405,8 +3405,8 @@
         </p:blipFill>
         <p:spPr>
           <a:xfrm>
-            <a:off x="2027853" y="3540701"/>
-            <a:ext cx="2006082" cy="1344143"/>
+            <a:off x="6755525" y="3915770"/>
+            <a:ext cx="2677702" cy="1794152"/>
           </a:xfrm>
           <a:prstGeom prst="rect">
             <a:avLst/>
@@ -3436,6 +3436,78 @@
           <a:xfrm>
             <a:off x="6267503" y="832029"/>
             <a:ext cx="1937935" cy="1314012"/>
+          </a:xfrm>
+          <a:prstGeom prst="rect">
+            <a:avLst/>
+          </a:prstGeom>
+        </p:spPr>
+      </p:pic>
+      <p:pic>
+        <p:nvPicPr>
+          <p:cNvPr id="4" name="圖片 3">
+            <a:extLst>
+              <a:ext uri="{FF2B5EF4-FFF2-40B4-BE49-F238E27FC236}">
+                <a16:creationId xmlns:a16="http://schemas.microsoft.com/office/drawing/2014/main" id="{E91F4B59-325C-4FA2-A00A-B668274F48A5}"/>
+              </a:ext>
+            </a:extLst>
+          </p:cNvPr>
+          <p:cNvPicPr>
+            <a:picLocks noChangeAspect="1"/>
+          </p:cNvPicPr>
+          <p:nvPr/>
+        </p:nvPicPr>
+        <p:blipFill>
+          <a:blip r:embed="rId6">
+            <a:extLst>
+              <a:ext uri="{28A0092B-C50C-407E-A947-70E740481C1C}">
+                <a14:useLocalDpi xmlns:a14="http://schemas.microsoft.com/office/drawing/2010/main" val="0"/>
+              </a:ext>
+            </a:extLst>
+          </a:blip>
+          <a:stretch>
+            <a:fillRect/>
+          </a:stretch>
+        </p:blipFill>
+        <p:spPr>
+          <a:xfrm>
+            <a:off x="1498449" y="3885907"/>
+            <a:ext cx="2162100" cy="1722472"/>
+          </a:xfrm>
+          <a:prstGeom prst="rect">
+            <a:avLst/>
+          </a:prstGeom>
+        </p:spPr>
+      </p:pic>
+      <p:pic>
+        <p:nvPicPr>
+          <p:cNvPr id="9" name="圖片 8">
+            <a:extLst>
+              <a:ext uri="{FF2B5EF4-FFF2-40B4-BE49-F238E27FC236}">
+                <a16:creationId xmlns:a16="http://schemas.microsoft.com/office/drawing/2014/main" id="{4C8E2404-AB09-43E8-9B9B-BAFD967EECA1}"/>
+              </a:ext>
+            </a:extLst>
+          </p:cNvPr>
+          <p:cNvPicPr>
+            <a:picLocks noChangeAspect="1"/>
+          </p:cNvPicPr>
+          <p:nvPr/>
+        </p:nvPicPr>
+        <p:blipFill>
+          <a:blip r:embed="rId7">
+            <a:extLst>
+              <a:ext uri="{28A0092B-C50C-407E-A947-70E740481C1C}">
+                <a14:useLocalDpi xmlns:a14="http://schemas.microsoft.com/office/drawing/2010/main" val="0"/>
+              </a:ext>
+            </a:extLst>
+          </a:blip>
+          <a:stretch>
+            <a:fillRect/>
+          </a:stretch>
+        </p:blipFill>
+        <p:spPr>
+          <a:xfrm>
+            <a:off x="4198776" y="3951610"/>
+            <a:ext cx="2018522" cy="1722472"/>
           </a:xfrm>
           <a:prstGeom prst="rect">
             <a:avLst/>

</xml_diff>